<commit_message>
modifikasi analisis kata alay pada data tweet.pptx
</commit_message>
<xml_diff>
--- a/analisis kata alay pada data tweet.pptx
+++ b/analisis kata alay pada data tweet.pptx
@@ -3350,7 +3350,7 @@
                 </a:solidFill>
                 <a:latin typeface="Open Sans"/>
               </a:rPr>
-              <a:t>Indonesia masuk dalam 10 besar Negara dengan masyarakat yang paling sering menghabiskan waktu dengan menggunakan media sosial. Jumlah pengguna aktif media sosial di Indonesia pada Januari 2023 sebanyak 60,4% dari populasi.  Komunikasi merupakan hal yang penting dalam melakukan hubungan di media sosial. Meskipun bahasa Indonesia menjadi bahasa persatuan, tidak jarang masyarakat menggunakan bahasa yang berbeda-beda. Hal ini dikarenakan Indonesia terdiri dari berbagai macam suku dan tentu bahasa yang berbeda. Seiring perkembangan jaman, terutama dikalangan anak muda, penggunaan bahsa semakin bervariasi. Muncul bahasa yang tidak baku di bahasa Indonesia sering dipakai untuk berkomunikasi. Hal ini bida disebabkan karena bahasa tersebut dianggap lebih kekinian dikalangan anak muda.</a:t>
+              <a:t>Indonesia masuk dalam 10 besar Negara dengan masyarakat yang paling sering menghabiskan waktu dengan menggunakan media sosial. Jumlah pengguna aktif media sosial di Indonesia pada Januari 2023 sebanyak 60,4% dari populasi.  Komunikasi merupakan hal yang penting dalam melakukan hubungan di media sosial. Meskipun bahasa Indonesia menjadi bahasa persatuan, tidak jarang masyarakat menggunakan bahasa yang berbeda-beda. Hal ini dikarenakan Indonesia terdiri dari berbagai macam suku dan tentu bahasa yang berbeda. Seiring perkembangan jaman, terutama dikalangan anak muda, penggunaan bahasa semakin bervariasi. Muncul bahasa yang tidak baku di bahasa Indonesia sering dipakai untuk berkomunikasi. Hal ini bisa disebabkan karena bahasa tersebut dianggap lebih kekinian dikalangan anak muda.</a:t>
             </a:r>
           </a:p>
           <a:p>
@@ -3497,7 +3497,7 @@
                 </a:solidFill>
                 <a:latin typeface="Open Sans"/>
               </a:rPr>
-              <a:t>Data pada penelitian ini bersumber dari Binar Academy. Data yang akan dianalisis ini adalah data yang memuat kumpulan teks dari postingan dan komentar dalam bahasa Indoensia yang diperoleh dari platform media sosial Twitter.</a:t>
+              <a:t>Data pada penelitian ini bersumber dari Binar Academy. Data yang akan dianalisis ini adalah data yang memuat kumpulan teks dari postingan dan komentar dalam bahasa Indonesia yang diperoleh dari platform media sosial Twitter.</a:t>
             </a:r>
           </a:p>
           <a:p>
@@ -3543,7 +3543,7 @@
                 </a:solidFill>
                 <a:latin typeface="Open Sans"/>
               </a:rPr>
-              <a:t> Pada langkah awal data teks di lakukan proses pembacaan dengan menggunakan </a:t>
+              <a:t>Pada langkah awal data teks di lakukan proses pembacaan dengan menggunakan </a:t>
             </a:r>
             <a:r>
               <a:rPr lang="en-US" sz="2499">
@@ -3579,7 +3579,7 @@
                 </a:solidFill>
                 <a:latin typeface="Open Sans"/>
               </a:rPr>
-              <a:t>.  Dara kamus alay juga akan diinputkan kedalam dataframe dengan melakukan mapping dan melakukan pengecekan apakah kata alay dalam kamus terdapat pada teks di data.csv, jika ada akan ditambahkan kolom baru pada dataframe yang berisi kata alay yang muncul.                                                                                                                                                                                                                                                                                                                                                                                                                                                                                                                                                                                                                                                                                                                                                                                                                                                                                                                                                                                                                                                                                                                                                                                                                                                                                                                                                                                                                                                                                                                                                                                                                                                                                                                                                                                                                                                                                                                                                                                                                                                                                                                                                                                                                                                                                                                                                                                                                                                                                                                                                                                                                                                                                                                                                                                                                                                                                                                                                                                                                                                                                                                                                                                                                                                                                                                                                                                                                                                                                                                                                                                    </a:t>
+              <a:t>.  Dari kamus alay juga akan diinputkan kedalam dataframe dengan melakukan mapping dan melakukan pengecekan apakah kata alay dalam kamus terdapat pada teks di data.csv, jika ada akan ditambahkan kolom baru pada dataframe yang berisi kata alay yang muncul.                                                                                                                                                                                                                                                                                                                                                                                                                                                                                                                                                                                                                                                                                                                                                                                                                                                                                                                                                                                                                                                                                                                                                                                                                                                                                                                                                                                                                                                                                                                                                                                                                                                                                                                                                                                                                                                                                                                                                                                                                                                                                                                                                                                                                                                                                                                                                                                                                                                                                                                                                                                                                                                                                                                                                                                                                                                                                                                                                                                                                                                                                                                                                                                                                                                                                                                                                                                                                                                                                                                                                                                    </a:t>
             </a:r>
           </a:p>
         </p:txBody>
@@ -3755,7 +3755,7 @@
                 </a:solidFill>
                 <a:latin typeface="Open Sans"/>
               </a:rPr>
-              <a:t>Tahap selanjutnya membuat kolom baru untuk menghitung jumlah kata alay pada setiap baris. kolom tersebut yang akan digunakan untuk melakukan descriptive analytics seperti rata-rata, dan standar deviasi. Selain itu panjang kata pada setiap baris juga akan dibuatkan kolom baru. dengan kedua kolom tersebut dapat dilakukan bivariate analysis guna mengetahui korelasi antara panjang kata dengan banyak kata alay yang ada.</a:t>
+              <a:t>Tahap selanjutnya membuat kolom baru untuk menghitung jumlah kata alay pada setiap baris. kolom tersebut yang akan digunakan untuk melakukan Descriptive Analytics seperti rata-rata, dan standar deviasi. Selain itu panjang kata pada setiap baris juga akan dibuatkan kolom baru. dengan kedua kolom tersebut dapat dilakukan bivariate analysis guna mengetahui korelasi antara panjang kata dengan banyak kata alay yang ada.</a:t>
             </a:r>
           </a:p>
           <a:p>
@@ -3778,7 +3778,7 @@
                 </a:solidFill>
                 <a:latin typeface="Open Sans"/>
               </a:rPr>
-              <a:t>Tahap berikutnya adalah visualisasi. dalam melakukan visualisasi disini digunakan bebrapa metode. yang pertama dengan bivariate analysis menggunakan kolom panjang kata dan panjang kata alay. kemudian dengan bar chart guna mengetahui 10 kata alay terbanyak yang sering keluar dalam data dan dengan wordcloud yang juga berfungsi mengetahui kata apa saja yang sering keluar pada data.</a:t>
+              <a:t>Tahap berikutnya adalah visualisasi. dalam melakukan visualisasi disini digunakan beberapa metode. yang pertama dengan bivariate analysis menggunakan kolom panjang kata dan panjang kata alay. kemudian dengan bar chart guna mengetahui 10 kata alay terbanyak yang sering keluar dalam data dan dengan wordcloud yang juga berfungsi mengetahui kata apa saja yang sering keluar pada data.</a:t>
             </a:r>
           </a:p>
           <a:p>
@@ -4001,7 +4001,7 @@
                 </a:solidFill>
                 <a:latin typeface="Open Sans Extra Bold"/>
               </a:rPr>
-              <a:t> ada pengaruh penggunaan kata alay dengan banyaknya kata yang ditulis oleh pengguna media sosial. sehingga semakin banyak pengguna menulisakn kata maka akan semakin sering pengguna media sosial menggunakan kata alay yang bertujuan untuk menghemat waktu penulisan ataupun biar kelihatan kekinian.</a:t>
+              <a:t> ada pengaruh penggunaan kata alay dengan banyaknya kata yang ditulis oleh pengguna media sosial. sehingga semakin banyak pengguna menuliskan kata maka akan semakin sering pengguna media sosial menggunakan kata alay yang bertujuan untuk menghemat waktu penulisan ataupun supaya kelihatan kekinian.</a:t>
             </a:r>
           </a:p>
           <a:p>

</xml_diff>